<commit_message>
Fixing directory- prior upload
</commit_message>
<xml_diff>
--- a/EXTRAS/DEMO.pptx
+++ b/EXTRAS/DEMO.pptx
@@ -309,7 +309,7 @@
           <a:p>
             <a:fld id="{E336C91D-1999-421F-AFA1-A20202843259}" type="datetimeFigureOut">
               <a:rPr lang="en-IE" smtClean="0"/>
-              <a:t>11/04/2019</a:t>
+              <a:t>27/04/2019</a:t>
             </a:fld>
             <a:endParaRPr lang="en-IE"/>
           </a:p>
@@ -745,7 +745,7 @@
           <a:p>
             <a:fld id="{E336C91D-1999-421F-AFA1-A20202843259}" type="datetimeFigureOut">
               <a:rPr lang="en-IE" smtClean="0"/>
-              <a:t>11/04/2019</a:t>
+              <a:t>27/04/2019</a:t>
             </a:fld>
             <a:endParaRPr lang="en-IE"/>
           </a:p>
@@ -995,7 +995,7 @@
           <a:p>
             <a:fld id="{E336C91D-1999-421F-AFA1-A20202843259}" type="datetimeFigureOut">
               <a:rPr lang="en-IE" smtClean="0"/>
-              <a:t>11/04/2019</a:t>
+              <a:t>27/04/2019</a:t>
             </a:fld>
             <a:endParaRPr lang="en-IE"/>
           </a:p>
@@ -1303,7 +1303,7 @@
           <a:p>
             <a:fld id="{E336C91D-1999-421F-AFA1-A20202843259}" type="datetimeFigureOut">
               <a:rPr lang="en-IE" smtClean="0"/>
-              <a:t>11/04/2019</a:t>
+              <a:t>27/04/2019</a:t>
             </a:fld>
             <a:endParaRPr lang="en-IE"/>
           </a:p>
@@ -1621,7 +1621,7 @@
           <a:p>
             <a:fld id="{E336C91D-1999-421F-AFA1-A20202843259}" type="datetimeFigureOut">
               <a:rPr lang="en-IE" smtClean="0"/>
-              <a:t>11/04/2019</a:t>
+              <a:t>27/04/2019</a:t>
             </a:fld>
             <a:endParaRPr lang="en-IE"/>
           </a:p>
@@ -1923,7 +1923,7 @@
           <a:p>
             <a:fld id="{E336C91D-1999-421F-AFA1-A20202843259}" type="datetimeFigureOut">
               <a:rPr lang="en-IE" smtClean="0"/>
-              <a:t>11/04/2019</a:t>
+              <a:t>27/04/2019</a:t>
             </a:fld>
             <a:endParaRPr lang="en-IE"/>
           </a:p>
@@ -2290,7 +2290,7 @@
           <a:p>
             <a:fld id="{E336C91D-1999-421F-AFA1-A20202843259}" type="datetimeFigureOut">
               <a:rPr lang="en-IE" smtClean="0"/>
-              <a:t>11/04/2019</a:t>
+              <a:t>27/04/2019</a:t>
             </a:fld>
             <a:endParaRPr lang="en-IE"/>
           </a:p>
@@ -2464,7 +2464,7 @@
           <a:p>
             <a:fld id="{E336C91D-1999-421F-AFA1-A20202843259}" type="datetimeFigureOut">
               <a:rPr lang="en-IE" smtClean="0"/>
-              <a:t>11/04/2019</a:t>
+              <a:t>27/04/2019</a:t>
             </a:fld>
             <a:endParaRPr lang="en-IE"/>
           </a:p>
@@ -2644,7 +2644,7 @@
           <a:p>
             <a:fld id="{E336C91D-1999-421F-AFA1-A20202843259}" type="datetimeFigureOut">
               <a:rPr lang="en-IE" smtClean="0"/>
-              <a:t>11/04/2019</a:t>
+              <a:t>27/04/2019</a:t>
             </a:fld>
             <a:endParaRPr lang="en-IE"/>
           </a:p>
@@ -2814,7 +2814,7 @@
           <a:p>
             <a:fld id="{E336C91D-1999-421F-AFA1-A20202843259}" type="datetimeFigureOut">
               <a:rPr lang="en-IE" smtClean="0"/>
-              <a:t>11/04/2019</a:t>
+              <a:t>27/04/2019</a:t>
             </a:fld>
             <a:endParaRPr lang="en-IE"/>
           </a:p>
@@ -3064,7 +3064,7 @@
           <a:p>
             <a:fld id="{E336C91D-1999-421F-AFA1-A20202843259}" type="datetimeFigureOut">
               <a:rPr lang="en-IE" smtClean="0"/>
-              <a:t>11/04/2019</a:t>
+              <a:t>27/04/2019</a:t>
             </a:fld>
             <a:endParaRPr lang="en-IE"/>
           </a:p>
@@ -3300,7 +3300,7 @@
           <a:p>
             <a:fld id="{E336C91D-1999-421F-AFA1-A20202843259}" type="datetimeFigureOut">
               <a:rPr lang="en-IE" smtClean="0"/>
-              <a:t>11/04/2019</a:t>
+              <a:t>27/04/2019</a:t>
             </a:fld>
             <a:endParaRPr lang="en-IE"/>
           </a:p>
@@ -3682,7 +3682,7 @@
           <a:p>
             <a:fld id="{E336C91D-1999-421F-AFA1-A20202843259}" type="datetimeFigureOut">
               <a:rPr lang="en-IE" smtClean="0"/>
-              <a:t>11/04/2019</a:t>
+              <a:t>27/04/2019</a:t>
             </a:fld>
             <a:endParaRPr lang="en-IE"/>
           </a:p>
@@ -3800,7 +3800,7 @@
           <a:p>
             <a:fld id="{E336C91D-1999-421F-AFA1-A20202843259}" type="datetimeFigureOut">
               <a:rPr lang="en-IE" smtClean="0"/>
-              <a:t>11/04/2019</a:t>
+              <a:t>27/04/2019</a:t>
             </a:fld>
             <a:endParaRPr lang="en-IE"/>
           </a:p>
@@ -3895,7 +3895,7 @@
           <a:p>
             <a:fld id="{E336C91D-1999-421F-AFA1-A20202843259}" type="datetimeFigureOut">
               <a:rPr lang="en-IE" smtClean="0"/>
-              <a:t>11/04/2019</a:t>
+              <a:t>27/04/2019</a:t>
             </a:fld>
             <a:endParaRPr lang="en-IE"/>
           </a:p>
@@ -4150,7 +4150,7 @@
           <a:p>
             <a:fld id="{E336C91D-1999-421F-AFA1-A20202843259}" type="datetimeFigureOut">
               <a:rPr lang="en-IE" smtClean="0"/>
-              <a:t>11/04/2019</a:t>
+              <a:t>27/04/2019</a:t>
             </a:fld>
             <a:endParaRPr lang="en-IE"/>
           </a:p>
@@ -4433,7 +4433,7 @@
           <a:p>
             <a:fld id="{E336C91D-1999-421F-AFA1-A20202843259}" type="datetimeFigureOut">
               <a:rPr lang="en-IE" smtClean="0"/>
-              <a:t>11/04/2019</a:t>
+              <a:t>27/04/2019</a:t>
             </a:fld>
             <a:endParaRPr lang="en-IE"/>
           </a:p>
@@ -4860,7 +4860,7 @@
           <a:p>
             <a:fld id="{E336C91D-1999-421F-AFA1-A20202843259}" type="datetimeFigureOut">
               <a:rPr lang="en-IE" smtClean="0"/>
-              <a:t>11/04/2019</a:t>
+              <a:t>27/04/2019</a:t>
             </a:fld>
             <a:endParaRPr lang="en-IE"/>
           </a:p>
@@ -8148,6 +8148,36 @@
           </a:p>
         </p:txBody>
       </p:sp>
+      <p:pic>
+        <p:nvPicPr>
+          <p:cNvPr id="2" name="Picture 1">
+            <a:extLst>
+              <a:ext uri="{FF2B5EF4-FFF2-40B4-BE49-F238E27FC236}">
+                <a16:creationId xmlns:a16="http://schemas.microsoft.com/office/drawing/2014/main" id="{42AB90EB-81C2-4B24-8B94-CFB9EE15F92B}"/>
+              </a:ext>
+            </a:extLst>
+          </p:cNvPr>
+          <p:cNvPicPr>
+            <a:picLocks noChangeAspect="1"/>
+          </p:cNvPicPr>
+          <p:nvPr/>
+        </p:nvPicPr>
+        <p:blipFill>
+          <a:blip r:embed="rId4"/>
+          <a:stretch>
+            <a:fillRect/>
+          </a:stretch>
+        </p:blipFill>
+        <p:spPr>
+          <a:xfrm>
+            <a:off x="2505075" y="533400"/>
+            <a:ext cx="7181850" cy="5791200"/>
+          </a:xfrm>
+          <a:prstGeom prst="rect">
+            <a:avLst/>
+          </a:prstGeom>
+        </p:spPr>
+      </p:pic>
     </p:spTree>
     <p:extLst>
       <p:ext uri="{BB962C8B-B14F-4D97-AF65-F5344CB8AC3E}">

</xml_diff>